<commit_message>
Added more to class eight slides
</commit_message>
<xml_diff>
--- a/slides/classeight/slides.pptx
+++ b/slides/classeight/slides.pptx
@@ -5,7 +5,7 @@
     <p:sldMasterId id="2147483660" r:id="rId1"/>
   </p:sldMasterIdLst>
   <p:notesMasterIdLst>
-    <p:notesMasterId r:id="rId21"/>
+    <p:notesMasterId r:id="rId22"/>
   </p:notesMasterIdLst>
   <p:sldIdLst>
     <p:sldId id="256" r:id="rId2"/>
@@ -18,15 +18,16 @@
     <p:sldId id="400" r:id="rId9"/>
     <p:sldId id="401" r:id="rId10"/>
     <p:sldId id="402" r:id="rId11"/>
-    <p:sldId id="403" r:id="rId12"/>
-    <p:sldId id="404" r:id="rId13"/>
-    <p:sldId id="405" r:id="rId14"/>
-    <p:sldId id="406" r:id="rId15"/>
-    <p:sldId id="407" r:id="rId16"/>
-    <p:sldId id="408" r:id="rId17"/>
-    <p:sldId id="409" r:id="rId18"/>
-    <p:sldId id="410" r:id="rId19"/>
-    <p:sldId id="267" r:id="rId20"/>
+    <p:sldId id="411" r:id="rId12"/>
+    <p:sldId id="403" r:id="rId13"/>
+    <p:sldId id="404" r:id="rId14"/>
+    <p:sldId id="405" r:id="rId15"/>
+    <p:sldId id="406" r:id="rId16"/>
+    <p:sldId id="407" r:id="rId17"/>
+    <p:sldId id="408" r:id="rId18"/>
+    <p:sldId id="409" r:id="rId19"/>
+    <p:sldId id="410" r:id="rId20"/>
+    <p:sldId id="267" r:id="rId21"/>
   </p:sldIdLst>
   <p:sldSz cx="9144000" cy="6858000" type="screen4x3"/>
   <p:notesSz cx="6858000" cy="9144000"/>
@@ -210,7 +211,7 @@
           <a:p>
             <a:fld id="{9B5D41C8-0A92-DD47-AB00-F0EFFD66679B}" type="datetimeFigureOut">
               <a:rPr lang="en-US" smtClean="0"/>
-              <a:t>10/29/11</a:t>
+              <a:t>10/31/11</a:t>
             </a:fld>
             <a:endParaRPr lang="en-US"/>
           </a:p>
@@ -651,7 +652,7 @@
           <a:p>
             <a:fld id="{F0AB357A-3C6D-9E43-AB07-807CDFEA83A0}" type="slidenum">
               <a:rPr lang="en-US" smtClean="0"/>
-              <a:t>16</a:t>
+              <a:t>17</a:t>
             </a:fld>
             <a:endParaRPr lang="en-US"/>
           </a:p>
@@ -762,7 +763,7 @@
           <a:p>
             <a:fld id="{F0AB357A-3C6D-9E43-AB07-807CDFEA83A0}" type="slidenum">
               <a:rPr lang="en-US" smtClean="0"/>
-              <a:t>17</a:t>
+              <a:t>18</a:t>
             </a:fld>
             <a:endParaRPr lang="en-US"/>
           </a:p>
@@ -861,7 +862,7 @@
           <a:p>
             <a:fld id="{F0AB357A-3C6D-9E43-AB07-807CDFEA83A0}" type="slidenum">
               <a:rPr lang="en-US" smtClean="0"/>
-              <a:t>18</a:t>
+              <a:t>19</a:t>
             </a:fld>
             <a:endParaRPr lang="en-US"/>
           </a:p>
@@ -957,7 +958,7 @@
           <a:p>
             <a:fld id="{F0AB357A-3C6D-9E43-AB07-807CDFEA83A0}" type="slidenum">
               <a:rPr lang="en-US" smtClean="0"/>
-              <a:t>19</a:t>
+              <a:t>20</a:t>
             </a:fld>
             <a:endParaRPr lang="en-US"/>
           </a:p>
@@ -1316,7 +1317,7 @@
           <a:p>
             <a:fld id="{F0AB357A-3C6D-9E43-AB07-807CDFEA83A0}" type="slidenum">
               <a:rPr lang="en-US" smtClean="0"/>
-              <a:t>11</a:t>
+              <a:t>12</a:t>
             </a:fld>
             <a:endParaRPr lang="en-US"/>
           </a:p>
@@ -1410,7 +1411,7 @@
           <a:p>
             <a:fld id="{F0AB357A-3C6D-9E43-AB07-807CDFEA83A0}" type="slidenum">
               <a:rPr lang="en-US" smtClean="0"/>
-              <a:t>12</a:t>
+              <a:t>13</a:t>
             </a:fld>
             <a:endParaRPr lang="en-US"/>
           </a:p>
@@ -1497,7 +1498,7 @@
           <a:p>
             <a:fld id="{F0AB357A-3C6D-9E43-AB07-807CDFEA83A0}" type="slidenum">
               <a:rPr lang="en-US" smtClean="0"/>
-              <a:t>13</a:t>
+              <a:t>14</a:t>
             </a:fld>
             <a:endParaRPr lang="en-US"/>
           </a:p>
@@ -1622,7 +1623,7 @@
           <a:p>
             <a:fld id="{F0AB357A-3C6D-9E43-AB07-807CDFEA83A0}" type="slidenum">
               <a:rPr lang="en-US" smtClean="0"/>
-              <a:t>14</a:t>
+              <a:t>15</a:t>
             </a:fld>
             <a:endParaRPr lang="en-US"/>
           </a:p>
@@ -1747,7 +1748,7 @@
           <a:p>
             <a:fld id="{F0AB357A-3C6D-9E43-AB07-807CDFEA83A0}" type="slidenum">
               <a:rPr lang="en-US" smtClean="0"/>
-              <a:t>15</a:t>
+              <a:t>16</a:t>
             </a:fld>
             <a:endParaRPr lang="en-US"/>
           </a:p>
@@ -2394,7 +2395,7 @@
             <a:fld id="{B7C3F878-F5E8-489B-AC8A-64F2A7E22C28}" type="datetimeFigureOut">
               <a:rPr lang="en-US" smtClean="0"/>
               <a:pPr/>
-              <a:t>10/29/11</a:t>
+              <a:t>10/31/11</a:t>
             </a:fld>
             <a:endParaRPr lang="en-US"/>
           </a:p>
@@ -2601,7 +2602,7 @@
             <a:fld id="{B7C3F878-F5E8-489B-AC8A-64F2A7E22C28}" type="datetimeFigureOut">
               <a:rPr lang="en-US" smtClean="0"/>
               <a:pPr/>
-              <a:t>10/29/11</a:t>
+              <a:t>10/31/11</a:t>
             </a:fld>
             <a:endParaRPr lang="en-US"/>
           </a:p>
@@ -2808,7 +2809,7 @@
             <a:fld id="{B7C3F878-F5E8-489B-AC8A-64F2A7E22C28}" type="datetimeFigureOut">
               <a:rPr lang="en-US" smtClean="0"/>
               <a:pPr/>
-              <a:t>10/29/11</a:t>
+              <a:t>10/31/11</a:t>
             </a:fld>
             <a:endParaRPr lang="en-US"/>
           </a:p>
@@ -3001,7 +3002,7 @@
             <a:fld id="{B7C3F878-F5E8-489B-AC8A-64F2A7E22C28}" type="datetimeFigureOut">
               <a:rPr lang="en-US" smtClean="0"/>
               <a:pPr/>
-              <a:t>10/29/11</a:t>
+              <a:t>10/31/11</a:t>
             </a:fld>
             <a:endParaRPr lang="en-US"/>
           </a:p>
@@ -3242,7 +3243,7 @@
             <a:fld id="{B7C3F878-F5E8-489B-AC8A-64F2A7E22C28}" type="datetimeFigureOut">
               <a:rPr lang="en-US" smtClean="0"/>
               <a:pPr/>
-              <a:t>10/29/11</a:t>
+              <a:t>10/31/11</a:t>
             </a:fld>
             <a:endParaRPr lang="en-US"/>
           </a:p>
@@ -3357,7 +3358,7 @@
             <a:fld id="{B7C3F878-F5E8-489B-AC8A-64F2A7E22C28}" type="datetimeFigureOut">
               <a:rPr lang="en-US" smtClean="0"/>
               <a:pPr/>
-              <a:t>10/29/11</a:t>
+              <a:t>10/31/11</a:t>
             </a:fld>
             <a:endParaRPr lang="en-US"/>
           </a:p>
@@ -3789,7 +3790,7 @@
             <a:fld id="{B7C3F878-F5E8-489B-AC8A-64F2A7E22C28}" type="datetimeFigureOut">
               <a:rPr lang="en-US" smtClean="0"/>
               <a:pPr/>
-              <a:t>10/29/11</a:t>
+              <a:t>10/31/11</a:t>
             </a:fld>
             <a:endParaRPr lang="en-US"/>
           </a:p>
@@ -4070,7 +4071,7 @@
             <a:fld id="{B7C3F878-F5E8-489B-AC8A-64F2A7E22C28}" type="datetimeFigureOut">
               <a:rPr lang="en-US" smtClean="0"/>
               <a:pPr/>
-              <a:t>10/29/11</a:t>
+              <a:t>10/31/11</a:t>
             </a:fld>
             <a:endParaRPr lang="en-US"/>
           </a:p>
@@ -4162,7 +4163,7 @@
             <a:fld id="{B7C3F878-F5E8-489B-AC8A-64F2A7E22C28}" type="datetimeFigureOut">
               <a:rPr lang="en-US" smtClean="0"/>
               <a:pPr/>
-              <a:t>10/29/11</a:t>
+              <a:t>10/31/11</a:t>
             </a:fld>
             <a:endParaRPr lang="en-US"/>
           </a:p>
@@ -5001,7 +5002,7 @@
             <a:fld id="{B7C3F878-F5E8-489B-AC8A-64F2A7E22C28}" type="datetimeFigureOut">
               <a:rPr lang="en-US" smtClean="0"/>
               <a:pPr/>
-              <a:t>10/29/11</a:t>
+              <a:t>10/31/11</a:t>
             </a:fld>
             <a:endParaRPr lang="en-US"/>
           </a:p>
@@ -5834,7 +5835,7 @@
             <a:fld id="{B7C3F878-F5E8-489B-AC8A-64F2A7E22C28}" type="datetimeFigureOut">
               <a:rPr lang="en-US" smtClean="0"/>
               <a:pPr/>
-              <a:t>10/29/11</a:t>
+              <a:t>10/31/11</a:t>
             </a:fld>
             <a:endParaRPr lang="en-US"/>
           </a:p>
@@ -6490,7 +6491,7 @@
             <a:fld id="{B7C3F878-F5E8-489B-AC8A-64F2A7E22C28}" type="datetimeFigureOut">
               <a:rPr lang="en-US" smtClean="0"/>
               <a:pPr/>
-              <a:t>10/29/11</a:t>
+              <a:t>10/31/11</a:t>
             </a:fld>
             <a:endParaRPr lang="en-US" dirty="0"/>
           </a:p>
@@ -6968,11 +6969,7 @@
           <a:p>
             <a:r>
               <a:rPr lang="en-US" dirty="0" smtClean="0"/>
-              <a:t>Class </a:t>
-            </a:r>
-            <a:r>
-              <a:rPr lang="en-US" dirty="0" smtClean="0"/>
-              <a:t>Eight</a:t>
+              <a:t>Class Eight</a:t>
             </a:r>
             <a:endParaRPr lang="en-US" dirty="0"/>
           </a:p>
@@ -6995,15 +6992,7 @@
           <a:p>
             <a:r>
               <a:rPr lang="en-US" dirty="0" smtClean="0"/>
-              <a:t>Layout and Design (Part </a:t>
-            </a:r>
-            <a:r>
-              <a:rPr lang="en-US" dirty="0" smtClean="0"/>
-              <a:t>II</a:t>
-            </a:r>
-            <a:r>
-              <a:rPr lang="en-US" dirty="0" smtClean="0"/>
-              <a:t>)</a:t>
+              <a:t>Layout and Design (Part II)</a:t>
             </a:r>
             <a:endParaRPr lang="en-US" dirty="0"/>
           </a:p>
@@ -7143,7 +7132,7 @@
       </p:grpSpPr>
       <p:sp>
         <p:nvSpPr>
-          <p:cNvPr id="2" name="Title 1"/>
+          <p:cNvPr id="4" name="Title 3"/>
           <p:cNvSpPr>
             <a:spLocks noGrp="1"/>
           </p:cNvSpPr>
@@ -7156,43 +7145,43 @@
           <a:bodyPr/>
           <a:lstStyle/>
           <a:p>
-            <a:r>
-              <a:rPr lang="en-US" dirty="0" smtClean="0"/>
-              <a:t>Grids</a:t>
+            <a:endParaRPr lang="en-US"/>
+          </a:p>
+        </p:txBody>
+      </p:sp>
+      <p:sp>
+        <p:nvSpPr>
+          <p:cNvPr id="5" name="Text Placeholder 4"/>
+          <p:cNvSpPr>
+            <a:spLocks noGrp="1"/>
+          </p:cNvSpPr>
+          <p:nvPr>
+            <p:ph type="body" idx="1"/>
+          </p:nvPr>
+        </p:nvSpPr>
+        <p:spPr/>
+        <p:txBody>
+          <a:bodyPr/>
+          <a:lstStyle/>
+          <a:p>
+            <a:r>
+              <a:rPr lang="en-US" dirty="0" smtClean="0">
+                <a:hlinkClick r:id="" action="ppaction://hlinkshowjump?jump=lastslide"/>
+              </a:rPr>
+              <a:t>Finally</a:t>
+            </a:r>
+            <a:r>
+              <a:rPr lang="en-US" dirty="0" smtClean="0"/>
+              <a:t>.</a:t>
             </a:r>
             <a:endParaRPr lang="en-US" dirty="0"/>
           </a:p>
         </p:txBody>
       </p:sp>
-      <p:pic>
-        <p:nvPicPr>
-          <p:cNvPr id="4" name="Content Placeholder 3" descr="2766414097_a8446d7916_o.jpg"/>
-          <p:cNvPicPr>
-            <a:picLocks noGrp="1" noChangeAspect="1"/>
-          </p:cNvPicPr>
-          <p:nvPr>
-            <p:ph idx="1"/>
-          </p:nvPr>
-        </p:nvPicPr>
-        <p:blipFill>
-          <a:blip r:embed="rId3">
-            <a:extLst>
-              <a:ext uri="{28A0092B-C50C-407E-A947-70E740481C1C}">
-                <a14:useLocalDpi xmlns:a14="http://schemas.microsoft.com/office/drawing/2010/main" val="0"/>
-              </a:ext>
-            </a:extLst>
-          </a:blip>
-          <a:srcRect t="6401" b="6401"/>
-          <a:stretch>
-            <a:fillRect/>
-          </a:stretch>
-        </p:blipFill>
-        <p:spPr/>
-      </p:pic>
     </p:spTree>
     <p:extLst>
       <p:ext uri="{BB962C8B-B14F-4D97-AF65-F5344CB8AC3E}">
-        <p14:creationId xmlns:p14="http://schemas.microsoft.com/office/powerpoint/2010/main" val="598681175"/>
+        <p14:creationId xmlns:p14="http://schemas.microsoft.com/office/powerpoint/2010/main" val="1486479227"/>
       </p:ext>
     </p:extLst>
   </p:cSld>
@@ -7243,6 +7232,91 @@
           <a:p>
             <a:r>
               <a:rPr lang="en-US" dirty="0" smtClean="0"/>
+              <a:t>Grids</a:t>
+            </a:r>
+            <a:endParaRPr lang="en-US" dirty="0"/>
+          </a:p>
+        </p:txBody>
+      </p:sp>
+      <p:pic>
+        <p:nvPicPr>
+          <p:cNvPr id="4" name="Content Placeholder 3" descr="2766414097_a8446d7916_o.jpg"/>
+          <p:cNvPicPr>
+            <a:picLocks noGrp="1" noChangeAspect="1"/>
+          </p:cNvPicPr>
+          <p:nvPr>
+            <p:ph idx="1"/>
+          </p:nvPr>
+        </p:nvPicPr>
+        <p:blipFill>
+          <a:blip r:embed="rId3">
+            <a:extLst>
+              <a:ext uri="{28A0092B-C50C-407E-A947-70E740481C1C}">
+                <a14:useLocalDpi xmlns:a14="http://schemas.microsoft.com/office/drawing/2010/main" val="0"/>
+              </a:ext>
+            </a:extLst>
+          </a:blip>
+          <a:srcRect t="6401" b="6401"/>
+          <a:stretch>
+            <a:fillRect/>
+          </a:stretch>
+        </p:blipFill>
+        <p:spPr/>
+      </p:pic>
+    </p:spTree>
+    <p:extLst>
+      <p:ext uri="{BB962C8B-B14F-4D97-AF65-F5344CB8AC3E}">
+        <p14:creationId xmlns:p14="http://schemas.microsoft.com/office/powerpoint/2010/main" val="598681175"/>
+      </p:ext>
+    </p:extLst>
+  </p:cSld>
+  <p:clrMapOvr>
+    <a:masterClrMapping/>
+  </p:clrMapOvr>
+  <p:timing>
+    <p:tnLst>
+      <p:par>
+        <p:cTn xmlns:p14="http://schemas.microsoft.com/office/powerpoint/2010/main" id="1" dur="indefinite" restart="never" nodeType="tmRoot"/>
+      </p:par>
+    </p:tnLst>
+  </p:timing>
+</p:sld>
+</file>
+
+<file path=ppt/slides/slide13.xml><?xml version="1.0" encoding="utf-8"?>
+<p:sld xmlns:a="http://schemas.openxmlformats.org/drawingml/2006/main" xmlns:r="http://schemas.openxmlformats.org/officeDocument/2006/relationships" xmlns:p="http://schemas.openxmlformats.org/presentationml/2006/main">
+  <p:cSld>
+    <p:spTree>
+      <p:nvGrpSpPr>
+        <p:cNvPr id="1" name=""/>
+        <p:cNvGrpSpPr/>
+        <p:nvPr/>
+      </p:nvGrpSpPr>
+      <p:grpSpPr>
+        <a:xfrm>
+          <a:off x="0" y="0"/>
+          <a:ext cx="0" cy="0"/>
+          <a:chOff x="0" y="0"/>
+          <a:chExt cx="0" cy="0"/>
+        </a:xfrm>
+      </p:grpSpPr>
+      <p:sp>
+        <p:nvSpPr>
+          <p:cNvPr id="2" name="Title 1"/>
+          <p:cNvSpPr>
+            <a:spLocks noGrp="1"/>
+          </p:cNvSpPr>
+          <p:nvPr>
+            <p:ph type="title"/>
+          </p:nvPr>
+        </p:nvSpPr>
+        <p:spPr/>
+        <p:txBody>
+          <a:bodyPr/>
+          <a:lstStyle/>
+          <a:p>
+            <a:r>
+              <a:rPr lang="en-US" dirty="0" smtClean="0"/>
               <a:t>Golden Ratio</a:t>
             </a:r>
             <a:endParaRPr lang="en-US" dirty="0"/>
@@ -7294,7 +7368,7 @@
 </p:sld>
 </file>
 
-<file path=ppt/slides/slide13.xml><?xml version="1.0" encoding="utf-8"?>
+<file path=ppt/slides/slide14.xml><?xml version="1.0" encoding="utf-8"?>
 <p:sld xmlns:a="http://schemas.openxmlformats.org/drawingml/2006/main" xmlns:r="http://schemas.openxmlformats.org/officeDocument/2006/relationships" xmlns:p="http://schemas.openxmlformats.org/presentationml/2006/main">
   <p:cSld>
     <p:spTree>
@@ -7361,90 +7435,6 @@
 </p:sld>
 </file>
 
-<file path=ppt/slides/slide14.xml><?xml version="1.0" encoding="utf-8"?>
-<p:sld xmlns:a="http://schemas.openxmlformats.org/drawingml/2006/main" xmlns:r="http://schemas.openxmlformats.org/officeDocument/2006/relationships" xmlns:p="http://schemas.openxmlformats.org/presentationml/2006/main">
-  <p:cSld>
-    <p:spTree>
-      <p:nvGrpSpPr>
-        <p:cNvPr id="1" name=""/>
-        <p:cNvGrpSpPr/>
-        <p:nvPr/>
-      </p:nvGrpSpPr>
-      <p:grpSpPr>
-        <a:xfrm>
-          <a:off x="0" y="0"/>
-          <a:ext cx="0" cy="0"/>
-          <a:chOff x="0" y="0"/>
-          <a:chExt cx="0" cy="0"/>
-        </a:xfrm>
-      </p:grpSpPr>
-      <p:sp>
-        <p:nvSpPr>
-          <p:cNvPr id="2" name="Title 1"/>
-          <p:cNvSpPr>
-            <a:spLocks noGrp="1"/>
-          </p:cNvSpPr>
-          <p:nvPr>
-            <p:ph type="title"/>
-          </p:nvPr>
-        </p:nvSpPr>
-        <p:spPr/>
-        <p:txBody>
-          <a:bodyPr/>
-          <a:lstStyle/>
-          <a:p>
-            <a:r>
-              <a:rPr lang="en-US" dirty="0"/>
-              <a:t>Symmetrical balance</a:t>
-            </a:r>
-          </a:p>
-        </p:txBody>
-      </p:sp>
-      <p:pic>
-        <p:nvPicPr>
-          <p:cNvPr id="7" name="Content Placeholder 6" descr="2698783482_20e1437b3d_b.jpg"/>
-          <p:cNvPicPr>
-            <a:picLocks noGrp="1" noChangeAspect="1"/>
-          </p:cNvPicPr>
-          <p:nvPr>
-            <p:ph idx="1"/>
-          </p:nvPr>
-        </p:nvPicPr>
-        <p:blipFill>
-          <a:blip r:embed="rId3">
-            <a:extLst>
-              <a:ext uri="{28A0092B-C50C-407E-A947-70E740481C1C}">
-                <a14:useLocalDpi xmlns:a14="http://schemas.microsoft.com/office/drawing/2010/main" val="0"/>
-              </a:ext>
-            </a:extLst>
-          </a:blip>
-          <a:srcRect t="11226" b="11226"/>
-          <a:stretch>
-            <a:fillRect/>
-          </a:stretch>
-        </p:blipFill>
-        <p:spPr/>
-      </p:pic>
-    </p:spTree>
-    <p:extLst>
-      <p:ext uri="{BB962C8B-B14F-4D97-AF65-F5344CB8AC3E}">
-        <p14:creationId xmlns:p14="http://schemas.microsoft.com/office/powerpoint/2010/main" val="3386911600"/>
-      </p:ext>
-    </p:extLst>
-  </p:cSld>
-  <p:clrMapOvr>
-    <a:masterClrMapping/>
-  </p:clrMapOvr>
-  <p:timing>
-    <p:tnLst>
-      <p:par>
-        <p:cTn xmlns:p14="http://schemas.microsoft.com/office/powerpoint/2010/main" id="1" dur="indefinite" restart="never" nodeType="tmRoot"/>
-      </p:par>
-    </p:tnLst>
-  </p:timing>
-</p:sld>
-</file>
-
 <file path=ppt/slides/slide15.xml><?xml version="1.0" encoding="utf-8"?>
 <p:sld xmlns:a="http://schemas.openxmlformats.org/drawingml/2006/main" xmlns:r="http://schemas.openxmlformats.org/officeDocument/2006/relationships" xmlns:p="http://schemas.openxmlformats.org/presentationml/2006/main">
   <p:cSld>
@@ -7474,26 +7464,19 @@
         </p:nvSpPr>
         <p:spPr/>
         <p:txBody>
-          <a:bodyPr>
-            <a:normAutofit/>
-          </a:bodyPr>
+          <a:bodyPr/>
           <a:lstStyle/>
           <a:p>
             <a:r>
               <a:rPr lang="en-US" dirty="0"/>
-              <a:t>Asymmetrical </a:t>
-            </a:r>
-            <a:r>
-              <a:rPr lang="en-US" dirty="0" smtClean="0"/>
-              <a:t>balance</a:t>
-            </a:r>
-            <a:endParaRPr lang="en-US" dirty="0"/>
+              <a:t>Symmetrical balance</a:t>
+            </a:r>
           </a:p>
         </p:txBody>
       </p:sp>
       <p:pic>
         <p:nvPicPr>
-          <p:cNvPr id="4" name="Content Placeholder 3" descr="3168102590_f84d113bd4_b.jpg"/>
+          <p:cNvPr id="7" name="Content Placeholder 6" descr="2698783482_20e1437b3d_b.jpg"/>
           <p:cNvPicPr>
             <a:picLocks noGrp="1" noChangeAspect="1"/>
           </p:cNvPicPr>
@@ -7509,7 +7492,7 @@
               </a:ext>
             </a:extLst>
           </a:blip>
-          <a:srcRect t="28190" b="28190"/>
+          <a:srcRect t="11226" b="11226"/>
           <a:stretch>
             <a:fillRect/>
           </a:stretch>
@@ -7519,7 +7502,7 @@
     </p:spTree>
     <p:extLst>
       <p:ext uri="{BB962C8B-B14F-4D97-AF65-F5344CB8AC3E}">
-        <p14:creationId xmlns:p14="http://schemas.microsoft.com/office/powerpoint/2010/main" val="928668261"/>
+        <p14:creationId xmlns:p14="http://schemas.microsoft.com/office/powerpoint/2010/main" val="3386911600"/>
       </p:ext>
     </p:extLst>
   </p:cSld>
@@ -7565,6 +7548,97 @@
         </p:nvSpPr>
         <p:spPr/>
         <p:txBody>
+          <a:bodyPr>
+            <a:normAutofit/>
+          </a:bodyPr>
+          <a:lstStyle/>
+          <a:p>
+            <a:r>
+              <a:rPr lang="en-US" dirty="0"/>
+              <a:t>Asymmetrical </a:t>
+            </a:r>
+            <a:r>
+              <a:rPr lang="en-US" dirty="0" smtClean="0"/>
+              <a:t>balance</a:t>
+            </a:r>
+            <a:endParaRPr lang="en-US" dirty="0"/>
+          </a:p>
+        </p:txBody>
+      </p:sp>
+      <p:pic>
+        <p:nvPicPr>
+          <p:cNvPr id="4" name="Content Placeholder 3" descr="3168102590_f84d113bd4_b.jpg"/>
+          <p:cNvPicPr>
+            <a:picLocks noGrp="1" noChangeAspect="1"/>
+          </p:cNvPicPr>
+          <p:nvPr>
+            <p:ph idx="1"/>
+          </p:nvPr>
+        </p:nvPicPr>
+        <p:blipFill>
+          <a:blip r:embed="rId3">
+            <a:extLst>
+              <a:ext uri="{28A0092B-C50C-407E-A947-70E740481C1C}">
+                <a14:useLocalDpi xmlns:a14="http://schemas.microsoft.com/office/drawing/2010/main" val="0"/>
+              </a:ext>
+            </a:extLst>
+          </a:blip>
+          <a:srcRect t="28190" b="28190"/>
+          <a:stretch>
+            <a:fillRect/>
+          </a:stretch>
+        </p:blipFill>
+        <p:spPr/>
+      </p:pic>
+    </p:spTree>
+    <p:extLst>
+      <p:ext uri="{BB962C8B-B14F-4D97-AF65-F5344CB8AC3E}">
+        <p14:creationId xmlns:p14="http://schemas.microsoft.com/office/powerpoint/2010/main" val="928668261"/>
+      </p:ext>
+    </p:extLst>
+  </p:cSld>
+  <p:clrMapOvr>
+    <a:masterClrMapping/>
+  </p:clrMapOvr>
+  <p:timing>
+    <p:tnLst>
+      <p:par>
+        <p:cTn xmlns:p14="http://schemas.microsoft.com/office/powerpoint/2010/main" id="1" dur="indefinite" restart="never" nodeType="tmRoot"/>
+      </p:par>
+    </p:tnLst>
+  </p:timing>
+</p:sld>
+</file>
+
+<file path=ppt/slides/slide17.xml><?xml version="1.0" encoding="utf-8"?>
+<p:sld xmlns:a="http://schemas.openxmlformats.org/drawingml/2006/main" xmlns:r="http://schemas.openxmlformats.org/officeDocument/2006/relationships" xmlns:p="http://schemas.openxmlformats.org/presentationml/2006/main">
+  <p:cSld>
+    <p:spTree>
+      <p:nvGrpSpPr>
+        <p:cNvPr id="1" name=""/>
+        <p:cNvGrpSpPr/>
+        <p:nvPr/>
+      </p:nvGrpSpPr>
+      <p:grpSpPr>
+        <a:xfrm>
+          <a:off x="0" y="0"/>
+          <a:ext cx="0" cy="0"/>
+          <a:chOff x="0" y="0"/>
+          <a:chExt cx="0" cy="0"/>
+        </a:xfrm>
+      </p:grpSpPr>
+      <p:sp>
+        <p:nvSpPr>
+          <p:cNvPr id="2" name="Title 1"/>
+          <p:cNvSpPr>
+            <a:spLocks noGrp="1"/>
+          </p:cNvSpPr>
+          <p:nvPr>
+            <p:ph type="title"/>
+          </p:nvPr>
+        </p:nvSpPr>
+        <p:spPr/>
+        <p:txBody>
           <a:bodyPr/>
           <a:lstStyle/>
           <a:p>
@@ -7620,7 +7694,7 @@
 </p:sld>
 </file>
 
-<file path=ppt/slides/slide17.xml><?xml version="1.0" encoding="utf-8"?>
+<file path=ppt/slides/slide18.xml><?xml version="1.0" encoding="utf-8"?>
 <p:sld xmlns:a="http://schemas.openxmlformats.org/drawingml/2006/main" xmlns:r="http://schemas.openxmlformats.org/officeDocument/2006/relationships" xmlns:p="http://schemas.openxmlformats.org/presentationml/2006/main">
   <p:cSld>
     <p:spTree>
@@ -7708,91 +7782,6 @@
 </p:sld>
 </file>
 
-<file path=ppt/slides/slide18.xml><?xml version="1.0" encoding="utf-8"?>
-<p:sld xmlns:a="http://schemas.openxmlformats.org/drawingml/2006/main" xmlns:r="http://schemas.openxmlformats.org/officeDocument/2006/relationships" xmlns:p="http://schemas.openxmlformats.org/presentationml/2006/main">
-  <p:cSld>
-    <p:spTree>
-      <p:nvGrpSpPr>
-        <p:cNvPr id="1" name=""/>
-        <p:cNvGrpSpPr/>
-        <p:nvPr/>
-      </p:nvGrpSpPr>
-      <p:grpSpPr>
-        <a:xfrm>
-          <a:off x="0" y="0"/>
-          <a:ext cx="0" cy="0"/>
-          <a:chOff x="0" y="0"/>
-          <a:chExt cx="0" cy="0"/>
-        </a:xfrm>
-      </p:grpSpPr>
-      <p:sp>
-        <p:nvSpPr>
-          <p:cNvPr id="2" name="Title 1"/>
-          <p:cNvSpPr>
-            <a:spLocks noGrp="1"/>
-          </p:cNvSpPr>
-          <p:nvPr>
-            <p:ph type="title"/>
-          </p:nvPr>
-        </p:nvSpPr>
-        <p:spPr/>
-        <p:txBody>
-          <a:bodyPr/>
-          <a:lstStyle/>
-          <a:p>
-            <a:r>
-              <a:rPr lang="en-US" dirty="0" smtClean="0"/>
-              <a:t>Vertical Golden Ratios</a:t>
-            </a:r>
-            <a:endParaRPr lang="en-US" dirty="0"/>
-          </a:p>
-        </p:txBody>
-      </p:sp>
-      <p:pic>
-        <p:nvPicPr>
-          <p:cNvPr id="4" name="Content Placeholder 3" descr="387233134_83778451d9_z.jpg"/>
-          <p:cNvPicPr>
-            <a:picLocks noGrp="1" noChangeAspect="1"/>
-          </p:cNvPicPr>
-          <p:nvPr>
-            <p:ph idx="1"/>
-          </p:nvPr>
-        </p:nvPicPr>
-        <p:blipFill>
-          <a:blip r:embed="rId3">
-            <a:extLst>
-              <a:ext uri="{28A0092B-C50C-407E-A947-70E740481C1C}">
-                <a14:useLocalDpi xmlns:a14="http://schemas.microsoft.com/office/drawing/2010/main" val="0"/>
-              </a:ext>
-            </a:extLst>
-          </a:blip>
-          <a:srcRect t="19688" b="19688"/>
-          <a:stretch>
-            <a:fillRect/>
-          </a:stretch>
-        </p:blipFill>
-        <p:spPr/>
-      </p:pic>
-    </p:spTree>
-    <p:extLst>
-      <p:ext uri="{BB962C8B-B14F-4D97-AF65-F5344CB8AC3E}">
-        <p14:creationId xmlns:p14="http://schemas.microsoft.com/office/powerpoint/2010/main" val="1972093454"/>
-      </p:ext>
-    </p:extLst>
-  </p:cSld>
-  <p:clrMapOvr>
-    <a:masterClrMapping/>
-  </p:clrMapOvr>
-  <p:timing>
-    <p:tnLst>
-      <p:par>
-        <p:cTn xmlns:p14="http://schemas.microsoft.com/office/powerpoint/2010/main" id="1" dur="indefinite" restart="never" nodeType="tmRoot"/>
-      </p:par>
-    </p:tnLst>
-  </p:timing>
-</p:sld>
-</file>
-
 <file path=ppt/slides/slide19.xml><?xml version="1.0" encoding="utf-8"?>
 <p:sld xmlns:a="http://schemas.openxmlformats.org/drawingml/2006/main" xmlns:r="http://schemas.openxmlformats.org/officeDocument/2006/relationships" xmlns:p="http://schemas.openxmlformats.org/presentationml/2006/main">
   <p:cSld>
@@ -7812,7 +7801,7 @@
       </p:grpSpPr>
       <p:sp>
         <p:nvSpPr>
-          <p:cNvPr id="9" name="Title 8"/>
+          <p:cNvPr id="2" name="Title 1"/>
           <p:cNvSpPr>
             <a:spLocks noGrp="1"/>
           </p:cNvSpPr>
@@ -7827,82 +7816,41 @@
           <a:p>
             <a:r>
               <a:rPr lang="en-US" dirty="0" smtClean="0"/>
-              <a:t>Class </a:t>
-            </a:r>
-            <a:r>
-              <a:rPr lang="en-US" dirty="0" smtClean="0"/>
-              <a:t>Nine</a:t>
+              <a:t>Vertical Golden Ratios</a:t>
             </a:r>
             <a:endParaRPr lang="en-US" dirty="0"/>
           </a:p>
         </p:txBody>
       </p:sp>
-      <p:sp>
-        <p:nvSpPr>
-          <p:cNvPr id="10" name="Text Placeholder 9"/>
-          <p:cNvSpPr>
-            <a:spLocks noGrp="1"/>
-          </p:cNvSpPr>
-          <p:nvPr>
-            <p:ph type="body" idx="1"/>
-          </p:nvPr>
-        </p:nvSpPr>
-        <p:spPr/>
-        <p:txBody>
-          <a:bodyPr/>
-          <a:lstStyle/>
-          <a:p>
-            <a:r>
-              <a:rPr lang="en-US" dirty="0" smtClean="0"/>
-              <a:t>Designing </a:t>
-            </a:r>
-            <a:r>
-              <a:rPr lang="en-US" dirty="0"/>
-              <a:t>W</a:t>
-            </a:r>
-            <a:r>
-              <a:rPr lang="en-US" dirty="0" smtClean="0"/>
-              <a:t>ith Color</a:t>
-            </a:r>
-            <a:endParaRPr lang="en-US" dirty="0"/>
-          </a:p>
-        </p:txBody>
-      </p:sp>
-      <p:sp>
-        <p:nvSpPr>
-          <p:cNvPr id="11" name="Footer Placeholder 10"/>
-          <p:cNvSpPr>
-            <a:spLocks noGrp="1"/>
-          </p:cNvSpPr>
-          <p:nvPr>
-            <p:ph type="ftr" sz="quarter" idx="11"/>
-          </p:nvPr>
-        </p:nvSpPr>
-        <p:spPr/>
-        <p:txBody>
-          <a:bodyPr/>
-          <a:lstStyle/>
-          <a:p>
-            <a:r>
-              <a:rPr lang="en-US" dirty="0"/>
-              <a:t>Assignment</a:t>
-            </a:r>
-            <a:r>
-              <a:rPr lang="en-US" dirty="0" smtClean="0"/>
-              <a:t>: </a:t>
-            </a:r>
-            <a:r>
-              <a:rPr lang="en-US" dirty="0"/>
-              <a:t>Read Chapter 5, personify your homepage</a:t>
-            </a:r>
-            <a:endParaRPr lang="en-US" dirty="0"/>
-          </a:p>
-        </p:txBody>
-      </p:sp>
+      <p:pic>
+        <p:nvPicPr>
+          <p:cNvPr id="4" name="Content Placeholder 3" descr="387233134_83778451d9_z.jpg"/>
+          <p:cNvPicPr>
+            <a:picLocks noGrp="1" noChangeAspect="1"/>
+          </p:cNvPicPr>
+          <p:nvPr>
+            <p:ph idx="1"/>
+          </p:nvPr>
+        </p:nvPicPr>
+        <p:blipFill>
+          <a:blip r:embed="rId3">
+            <a:extLst>
+              <a:ext uri="{28A0092B-C50C-407E-A947-70E740481C1C}">
+                <a14:useLocalDpi xmlns:a14="http://schemas.microsoft.com/office/drawing/2010/main" val="0"/>
+              </a:ext>
+            </a:extLst>
+          </a:blip>
+          <a:srcRect t="19688" b="19688"/>
+          <a:stretch>
+            <a:fillRect/>
+          </a:stretch>
+        </p:blipFill>
+        <p:spPr/>
+      </p:pic>
     </p:spTree>
     <p:extLst>
       <p:ext uri="{BB962C8B-B14F-4D97-AF65-F5344CB8AC3E}">
-        <p14:creationId xmlns:p14="http://schemas.microsoft.com/office/powerpoint/2010/main" val="472547524"/>
+        <p14:creationId xmlns:p14="http://schemas.microsoft.com/office/powerpoint/2010/main" val="1972093454"/>
       </p:ext>
     </p:extLst>
   </p:cSld>
@@ -8015,13 +7963,6 @@
             <a:endParaRPr lang="en-US" dirty="0"/>
           </a:p>
           <a:p>
-            <a:r>
-              <a:rPr lang="en-US" dirty="0" smtClean="0"/>
-              <a:t>UPDATE</a:t>
-            </a:r>
-            <a:endParaRPr lang="en-US" dirty="0"/>
-          </a:p>
-          <a:p>
             <a:pPr>
               <a:buFont typeface="Wingdings" charset="2"/>
               <a:buChar char="v"/>
@@ -8038,6 +7979,127 @@
     <p:extLst>
       <p:ext uri="{BB962C8B-B14F-4D97-AF65-F5344CB8AC3E}">
         <p14:creationId xmlns:p14="http://schemas.microsoft.com/office/powerpoint/2010/main" val="3889961293"/>
+      </p:ext>
+    </p:extLst>
+  </p:cSld>
+  <p:clrMapOvr>
+    <a:masterClrMapping/>
+  </p:clrMapOvr>
+  <p:timing>
+    <p:tnLst>
+      <p:par>
+        <p:cTn xmlns:p14="http://schemas.microsoft.com/office/powerpoint/2010/main" id="1" dur="indefinite" restart="never" nodeType="tmRoot"/>
+      </p:par>
+    </p:tnLst>
+  </p:timing>
+</p:sld>
+</file>
+
+<file path=ppt/slides/slide20.xml><?xml version="1.0" encoding="utf-8"?>
+<p:sld xmlns:a="http://schemas.openxmlformats.org/drawingml/2006/main" xmlns:r="http://schemas.openxmlformats.org/officeDocument/2006/relationships" xmlns:p="http://schemas.openxmlformats.org/presentationml/2006/main">
+  <p:cSld>
+    <p:spTree>
+      <p:nvGrpSpPr>
+        <p:cNvPr id="1" name=""/>
+        <p:cNvGrpSpPr/>
+        <p:nvPr/>
+      </p:nvGrpSpPr>
+      <p:grpSpPr>
+        <a:xfrm>
+          <a:off x="0" y="0"/>
+          <a:ext cx="0" cy="0"/>
+          <a:chOff x="0" y="0"/>
+          <a:chExt cx="0" cy="0"/>
+        </a:xfrm>
+      </p:grpSpPr>
+      <p:sp>
+        <p:nvSpPr>
+          <p:cNvPr id="9" name="Title 8"/>
+          <p:cNvSpPr>
+            <a:spLocks noGrp="1"/>
+          </p:cNvSpPr>
+          <p:nvPr>
+            <p:ph type="title"/>
+          </p:nvPr>
+        </p:nvSpPr>
+        <p:spPr/>
+        <p:txBody>
+          <a:bodyPr/>
+          <a:lstStyle/>
+          <a:p>
+            <a:r>
+              <a:rPr lang="en-US" dirty="0" smtClean="0"/>
+              <a:t>Class Nine</a:t>
+            </a:r>
+            <a:endParaRPr lang="en-US" dirty="0"/>
+          </a:p>
+        </p:txBody>
+      </p:sp>
+      <p:sp>
+        <p:nvSpPr>
+          <p:cNvPr id="10" name="Text Placeholder 9"/>
+          <p:cNvSpPr>
+            <a:spLocks noGrp="1"/>
+          </p:cNvSpPr>
+          <p:nvPr>
+            <p:ph type="body" idx="1"/>
+          </p:nvPr>
+        </p:nvSpPr>
+        <p:spPr/>
+        <p:txBody>
+          <a:bodyPr/>
+          <a:lstStyle/>
+          <a:p>
+            <a:r>
+              <a:rPr lang="en-US" dirty="0" smtClean="0"/>
+              <a:t>Designing </a:t>
+            </a:r>
+            <a:r>
+              <a:rPr lang="en-US" dirty="0"/>
+              <a:t>W</a:t>
+            </a:r>
+            <a:r>
+              <a:rPr lang="en-US" dirty="0" smtClean="0"/>
+              <a:t>ith Color</a:t>
+            </a:r>
+            <a:endParaRPr lang="en-US" dirty="0"/>
+          </a:p>
+        </p:txBody>
+      </p:sp>
+      <p:sp>
+        <p:nvSpPr>
+          <p:cNvPr id="11" name="Footer Placeholder 10"/>
+          <p:cNvSpPr>
+            <a:spLocks noGrp="1"/>
+          </p:cNvSpPr>
+          <p:nvPr>
+            <p:ph type="ftr" sz="quarter" idx="11"/>
+          </p:nvPr>
+        </p:nvSpPr>
+        <p:spPr/>
+        <p:txBody>
+          <a:bodyPr/>
+          <a:lstStyle/>
+          <a:p>
+            <a:r>
+              <a:rPr lang="en-US" dirty="0"/>
+              <a:t>Assignment</a:t>
+            </a:r>
+            <a:r>
+              <a:rPr lang="en-US" dirty="0" smtClean="0"/>
+              <a:t>: </a:t>
+            </a:r>
+            <a:r>
+              <a:rPr lang="en-US" dirty="0"/>
+              <a:t>Read Chapter 5, personify your homepage</a:t>
+            </a:r>
+          </a:p>
+        </p:txBody>
+      </p:sp>
+    </p:spTree>
+    <p:extLst>
+      <p:ext uri="{BB962C8B-B14F-4D97-AF65-F5344CB8AC3E}">
+        <p14:creationId xmlns:p14="http://schemas.microsoft.com/office/powerpoint/2010/main" val="472547524"/>
       </p:ext>
     </p:extLst>
   </p:cSld>
@@ -8117,25 +8179,49 @@
           <a:p>
             <a:pPr lvl="1"/>
             <a:r>
-              <a:rPr lang="en-US" dirty="0" smtClean="0"/>
-              <a:t>Entertaining slides</a:t>
-            </a:r>
+              <a:rPr lang="en-US" dirty="0"/>
+              <a:t>Informative </a:t>
+            </a:r>
+            <a:r>
+              <a:rPr lang="en-US" dirty="0" smtClean="0"/>
+              <a:t>slides?</a:t>
+            </a:r>
+            <a:endParaRPr lang="en-US" dirty="0"/>
           </a:p>
           <a:p>
             <a:pPr lvl="1"/>
             <a:r>
-              <a:rPr lang="en-US" dirty="0"/>
-              <a:t>I</a:t>
-            </a:r>
-            <a:r>
-              <a:rPr lang="en-US" dirty="0" smtClean="0"/>
-              <a:t>nformative slides</a:t>
-            </a:r>
-          </a:p>
-          <a:p>
-            <a:r>
-              <a:rPr lang="en-US" dirty="0" smtClean="0"/>
-              <a:t>Guest speaker! (… ?)</a:t>
+              <a:rPr lang="en-US" dirty="0" smtClean="0"/>
+              <a:t>Entertaining slides?</a:t>
+            </a:r>
+            <a:endParaRPr lang="en-US" dirty="0" smtClean="0"/>
+          </a:p>
+          <a:p>
+            <a:r>
+              <a:rPr lang="en-US" dirty="0" smtClean="0"/>
+              <a:t>Guest </a:t>
+            </a:r>
+            <a:r>
+              <a:rPr lang="en-US" dirty="0" smtClean="0"/>
+              <a:t>speaker</a:t>
+            </a:r>
+            <a:r>
+              <a:rPr lang="en-US" dirty="0" smtClean="0"/>
+              <a:t>!</a:t>
+            </a:r>
+          </a:p>
+          <a:p>
+            <a:pPr lvl="1"/>
+            <a:r>
+              <a:rPr lang="en-US" dirty="0" smtClean="0"/>
+              <a:t>Tara Adamson, graphic / web designer</a:t>
+            </a:r>
+          </a:p>
+          <a:p>
+            <a:pPr lvl="1"/>
+            <a:r>
+              <a:rPr lang="en-US" dirty="0" smtClean="0"/>
+              <a:t>What do you want to know?</a:t>
             </a:r>
             <a:endParaRPr lang="en-US" dirty="0" smtClean="0"/>
           </a:p>

</xml_diff>